<commit_message>
Präsentation für Entwurf erstellt
</commit_message>
<xml_diff>
--- a/doc/entwurf/präsentation/pres_entwurf.pptx
+++ b/doc/entwurf/präsentation/pres_entwurf.pptx
@@ -160,7 +160,7 @@
   </p:defaultTextStyle>
   <p:extLst>
     <p:ext uri="{EFAFB233-063F-42B5-8137-9DF3F51BA10A}">
-      <p15:sldGuideLst xmlns="" xmlns:p15="http://schemas.microsoft.com/office/powerpoint/2012/main">
+      <p15:sldGuideLst xmlns:p15="http://schemas.microsoft.com/office/powerpoint/2012/main" xmlns="">
         <p15:guide id="1" orient="horz" pos="2160">
           <p15:clr>
             <a:srgbClr val="A4A3A4"/>
@@ -174,7 +174,7 @@
       </p15:sldGuideLst>
     </p:ext>
     <p:ext uri="{2D200454-40CA-4A62-9FC3-DE9A4176ACB9}">
-      <p15:notesGuideLst xmlns="" xmlns:p15="http://schemas.microsoft.com/office/powerpoint/2012/main"/>
+      <p15:notesGuideLst xmlns:p15="http://schemas.microsoft.com/office/powerpoint/2012/main" xmlns=""/>
     </p:ext>
   </p:extLst>
 </p:presentation>
@@ -5438,7 +5438,7 @@
           </a:r>
           <a:r>
             <a:rPr lang="de-DE" dirty="0" err="1" smtClean="0"/>
-            <a:t>Openstreetmap</a:t>
+            <a:t>OpenStreetMap</a:t>
           </a:r>
           <a:endParaRPr lang="de-DE" dirty="0"/>
         </a:p>
@@ -6456,6 +6456,13 @@
         </dgm:presLayoutVars>
       </dgm:prSet>
       <dgm:spPr/>
+      <dgm:t>
+        <a:bodyPr/>
+        <a:lstStyle/>
+        <a:p>
+          <a:endParaRPr lang="de-DE"/>
+        </a:p>
+      </dgm:t>
     </dgm:pt>
     <dgm:pt modelId="{525AC2B9-A9B3-421F-8295-DDDAEF106982}" type="pres">
       <dgm:prSet presAssocID="{2B66A1F6-12D1-4DDD-9B5C-5D8ED978AECC}" presName="node" presStyleLbl="node1" presStyleIdx="0" presStyleCnt="5">
@@ -6464,6 +6471,13 @@
         </dgm:presLayoutVars>
       </dgm:prSet>
       <dgm:spPr/>
+      <dgm:t>
+        <a:bodyPr/>
+        <a:lstStyle/>
+        <a:p>
+          <a:endParaRPr lang="de-DE"/>
+        </a:p>
+      </dgm:t>
     </dgm:pt>
     <dgm:pt modelId="{98EF8E6B-C524-489F-AD3D-B2FA182CAA53}" type="pres">
       <dgm:prSet presAssocID="{2B66A1F6-12D1-4DDD-9B5C-5D8ED978AECC}" presName="spNode" presStyleCnt="0"/>
@@ -6472,6 +6486,13 @@
     <dgm:pt modelId="{F7855BF3-22A8-429C-B4D1-32076FE04AE0}" type="pres">
       <dgm:prSet presAssocID="{9A60A16F-A66C-4ED2-9A40-6E30423E9BF5}" presName="sibTrans" presStyleLbl="sibTrans1D1" presStyleIdx="0" presStyleCnt="5"/>
       <dgm:spPr/>
+      <dgm:t>
+        <a:bodyPr/>
+        <a:lstStyle/>
+        <a:p>
+          <a:endParaRPr lang="de-DE"/>
+        </a:p>
+      </dgm:t>
     </dgm:pt>
     <dgm:pt modelId="{D81CD727-4EB5-457B-AA0A-B207EB369262}" type="pres">
       <dgm:prSet presAssocID="{0C3ACD0E-FE3E-4458-84C9-2C40F787C9E0}" presName="node" presStyleLbl="node1" presStyleIdx="1" presStyleCnt="5">
@@ -6480,6 +6501,13 @@
         </dgm:presLayoutVars>
       </dgm:prSet>
       <dgm:spPr/>
+      <dgm:t>
+        <a:bodyPr/>
+        <a:lstStyle/>
+        <a:p>
+          <a:endParaRPr lang="de-DE"/>
+        </a:p>
+      </dgm:t>
     </dgm:pt>
     <dgm:pt modelId="{DA00E07C-FBAC-4209-97F3-F7B9DE23205B}" type="pres">
       <dgm:prSet presAssocID="{0C3ACD0E-FE3E-4458-84C9-2C40F787C9E0}" presName="spNode" presStyleCnt="0"/>
@@ -6488,6 +6516,13 @@
     <dgm:pt modelId="{05D4ACD9-016A-4612-B7BA-E29F5EC598F2}" type="pres">
       <dgm:prSet presAssocID="{9225B7DA-BB33-4A44-A21B-3D73446A352E}" presName="sibTrans" presStyleLbl="sibTrans1D1" presStyleIdx="1" presStyleCnt="5"/>
       <dgm:spPr/>
+      <dgm:t>
+        <a:bodyPr/>
+        <a:lstStyle/>
+        <a:p>
+          <a:endParaRPr lang="de-DE"/>
+        </a:p>
+      </dgm:t>
     </dgm:pt>
     <dgm:pt modelId="{64A0B913-B6DA-40A5-87B2-80D3211482C0}" type="pres">
       <dgm:prSet presAssocID="{80F6A064-E0C0-445B-837A-BF62EBC510F1}" presName="node" presStyleLbl="node1" presStyleIdx="2" presStyleCnt="5">
@@ -6496,6 +6531,13 @@
         </dgm:presLayoutVars>
       </dgm:prSet>
       <dgm:spPr/>
+      <dgm:t>
+        <a:bodyPr/>
+        <a:lstStyle/>
+        <a:p>
+          <a:endParaRPr lang="de-DE"/>
+        </a:p>
+      </dgm:t>
     </dgm:pt>
     <dgm:pt modelId="{2CFE9CC4-1423-465A-85FA-7B312F7EDD28}" type="pres">
       <dgm:prSet presAssocID="{80F6A064-E0C0-445B-837A-BF62EBC510F1}" presName="spNode" presStyleCnt="0"/>
@@ -6504,6 +6546,13 @@
     <dgm:pt modelId="{34FCCFF9-3C73-4A16-9E5C-054DD6F53C32}" type="pres">
       <dgm:prSet presAssocID="{00023D41-C998-4F73-B719-2AA493E23450}" presName="sibTrans" presStyleLbl="sibTrans1D1" presStyleIdx="2" presStyleCnt="5"/>
       <dgm:spPr/>
+      <dgm:t>
+        <a:bodyPr/>
+        <a:lstStyle/>
+        <a:p>
+          <a:endParaRPr lang="de-DE"/>
+        </a:p>
+      </dgm:t>
     </dgm:pt>
     <dgm:pt modelId="{6AC99B47-2CB9-468A-A1B6-25538D41966B}" type="pres">
       <dgm:prSet presAssocID="{6AC6B8CA-4567-4603-9CBB-067A92FC918B}" presName="node" presStyleLbl="node1" presStyleIdx="3" presStyleCnt="5">
@@ -6512,6 +6561,13 @@
         </dgm:presLayoutVars>
       </dgm:prSet>
       <dgm:spPr/>
+      <dgm:t>
+        <a:bodyPr/>
+        <a:lstStyle/>
+        <a:p>
+          <a:endParaRPr lang="de-DE"/>
+        </a:p>
+      </dgm:t>
     </dgm:pt>
     <dgm:pt modelId="{B4F23715-E6CD-43DB-9349-EC9B9683AA94}" type="pres">
       <dgm:prSet presAssocID="{6AC6B8CA-4567-4603-9CBB-067A92FC918B}" presName="spNode" presStyleCnt="0"/>
@@ -6520,6 +6576,13 @@
     <dgm:pt modelId="{02B029A9-3839-40BE-86FD-924212B8FE47}" type="pres">
       <dgm:prSet presAssocID="{4C573742-A7BE-4E0C-8C5C-646F44DF24E2}" presName="sibTrans" presStyleLbl="sibTrans1D1" presStyleIdx="3" presStyleCnt="5"/>
       <dgm:spPr/>
+      <dgm:t>
+        <a:bodyPr/>
+        <a:lstStyle/>
+        <a:p>
+          <a:endParaRPr lang="de-DE"/>
+        </a:p>
+      </dgm:t>
     </dgm:pt>
     <dgm:pt modelId="{780F3454-400F-4740-B57A-513D9F9B6B4E}" type="pres">
       <dgm:prSet presAssocID="{00CC421B-497A-4F76-A442-1E9E52125F05}" presName="node" presStyleLbl="node1" presStyleIdx="4" presStyleCnt="5">
@@ -6528,6 +6591,13 @@
         </dgm:presLayoutVars>
       </dgm:prSet>
       <dgm:spPr/>
+      <dgm:t>
+        <a:bodyPr/>
+        <a:lstStyle/>
+        <a:p>
+          <a:endParaRPr lang="de-DE"/>
+        </a:p>
+      </dgm:t>
     </dgm:pt>
     <dgm:pt modelId="{2BD21919-AF81-4455-87D7-FEB7023DAA44}" type="pres">
       <dgm:prSet presAssocID="{00CC421B-497A-4F76-A442-1E9E52125F05}" presName="spNode" presStyleCnt="0"/>
@@ -6536,25 +6606,32 @@
     <dgm:pt modelId="{B65EF14B-FA96-4748-A635-8BC6E9A10AA7}" type="pres">
       <dgm:prSet presAssocID="{CEA9F828-BE57-453A-A54E-A6EC33AFBCCD}" presName="sibTrans" presStyleLbl="sibTrans1D1" presStyleIdx="4" presStyleCnt="5"/>
       <dgm:spPr/>
+      <dgm:t>
+        <a:bodyPr/>
+        <a:lstStyle/>
+        <a:p>
+          <a:endParaRPr lang="de-DE"/>
+        </a:p>
+      </dgm:t>
     </dgm:pt>
   </dgm:ptLst>
   <dgm:cxnLst>
+    <dgm:cxn modelId="{DDD5AC35-7B06-4665-826C-B106F4C9FC5D}" srcId="{3B5F74FA-ED2F-4EA2-82BC-7E9048CFDC9F}" destId="{6AC6B8CA-4567-4603-9CBB-067A92FC918B}" srcOrd="3" destOrd="0" parTransId="{699C2746-D394-40EB-A4D4-67E9BF777AE9}" sibTransId="{4C573742-A7BE-4E0C-8C5C-646F44DF24E2}"/>
+    <dgm:cxn modelId="{27652898-4788-4532-8B35-8E71ED80781E}" type="presOf" srcId="{0C3ACD0E-FE3E-4458-84C9-2C40F787C9E0}" destId="{D81CD727-4EB5-457B-AA0A-B207EB369262}" srcOrd="0" destOrd="0" presId="urn:microsoft.com/office/officeart/2005/8/layout/cycle5"/>
+    <dgm:cxn modelId="{E78FAEEE-33FB-4382-8E5B-AD00BE7939B7}" type="presOf" srcId="{9225B7DA-BB33-4A44-A21B-3D73446A352E}" destId="{05D4ACD9-016A-4612-B7BA-E29F5EC598F2}" srcOrd="0" destOrd="0" presId="urn:microsoft.com/office/officeart/2005/8/layout/cycle5"/>
+    <dgm:cxn modelId="{E63A397D-77E4-48F1-8416-55B4A08D5E52}" type="presOf" srcId="{9A60A16F-A66C-4ED2-9A40-6E30423E9BF5}" destId="{F7855BF3-22A8-429C-B4D1-32076FE04AE0}" srcOrd="0" destOrd="0" presId="urn:microsoft.com/office/officeart/2005/8/layout/cycle5"/>
+    <dgm:cxn modelId="{5A2A68D8-6F07-403D-8CA9-F6D2664DFB69}" srcId="{3B5F74FA-ED2F-4EA2-82BC-7E9048CFDC9F}" destId="{0C3ACD0E-FE3E-4458-84C9-2C40F787C9E0}" srcOrd="1" destOrd="0" parTransId="{61672426-A5FC-46BF-AEF9-A15B553291C5}" sibTransId="{9225B7DA-BB33-4A44-A21B-3D73446A352E}"/>
+    <dgm:cxn modelId="{05A257C9-FF54-4F8F-8A67-5C24CECF24FD}" srcId="{3B5F74FA-ED2F-4EA2-82BC-7E9048CFDC9F}" destId="{00CC421B-497A-4F76-A442-1E9E52125F05}" srcOrd="4" destOrd="0" parTransId="{C6E25FDA-5BC3-4561-BC2C-A26F1CF16EDB}" sibTransId="{CEA9F828-BE57-453A-A54E-A6EC33AFBCCD}"/>
+    <dgm:cxn modelId="{C9B954CF-064D-4233-8436-EA768FAAD9C3}" type="presOf" srcId="{6AC6B8CA-4567-4603-9CBB-067A92FC918B}" destId="{6AC99B47-2CB9-468A-A1B6-25538D41966B}" srcOrd="0" destOrd="0" presId="urn:microsoft.com/office/officeart/2005/8/layout/cycle5"/>
+    <dgm:cxn modelId="{A3A9C847-8016-4C56-87CF-0D758AC0FD37}" type="presOf" srcId="{2B66A1F6-12D1-4DDD-9B5C-5D8ED978AECC}" destId="{525AC2B9-A9B3-421F-8295-DDDAEF106982}" srcOrd="0" destOrd="0" presId="urn:microsoft.com/office/officeart/2005/8/layout/cycle5"/>
+    <dgm:cxn modelId="{C4B3AAC6-396C-4177-8CC8-C9B450993F9C}" type="presOf" srcId="{80F6A064-E0C0-445B-837A-BF62EBC510F1}" destId="{64A0B913-B6DA-40A5-87B2-80D3211482C0}" srcOrd="0" destOrd="0" presId="urn:microsoft.com/office/officeart/2005/8/layout/cycle5"/>
+    <dgm:cxn modelId="{78C2E60F-DCA1-42FA-BC34-6C82F1FB010D}" type="presOf" srcId="{4C573742-A7BE-4E0C-8C5C-646F44DF24E2}" destId="{02B029A9-3839-40BE-86FD-924212B8FE47}" srcOrd="0" destOrd="0" presId="urn:microsoft.com/office/officeart/2005/8/layout/cycle5"/>
+    <dgm:cxn modelId="{615CB036-1AE7-4CDB-9C9A-9ACD651743DF}" type="presOf" srcId="{00023D41-C998-4F73-B719-2AA493E23450}" destId="{34FCCFF9-3C73-4A16-9E5C-054DD6F53C32}" srcOrd="0" destOrd="0" presId="urn:microsoft.com/office/officeart/2005/8/layout/cycle5"/>
     <dgm:cxn modelId="{21A4F764-8C5C-4AB0-B558-F7714DE7A985}" srcId="{3B5F74FA-ED2F-4EA2-82BC-7E9048CFDC9F}" destId="{2B66A1F6-12D1-4DDD-9B5C-5D8ED978AECC}" srcOrd="0" destOrd="0" parTransId="{B59F34F6-B3D7-4E9E-B83C-897B55D721B3}" sibTransId="{9A60A16F-A66C-4ED2-9A40-6E30423E9BF5}"/>
-    <dgm:cxn modelId="{C4B3AAC6-396C-4177-8CC8-C9B450993F9C}" type="presOf" srcId="{80F6A064-E0C0-445B-837A-BF62EBC510F1}" destId="{64A0B913-B6DA-40A5-87B2-80D3211482C0}" srcOrd="0" destOrd="0" presId="urn:microsoft.com/office/officeart/2005/8/layout/cycle5"/>
-    <dgm:cxn modelId="{05A257C9-FF54-4F8F-8A67-5C24CECF24FD}" srcId="{3B5F74FA-ED2F-4EA2-82BC-7E9048CFDC9F}" destId="{00CC421B-497A-4F76-A442-1E9E52125F05}" srcOrd="4" destOrd="0" parTransId="{C6E25FDA-5BC3-4561-BC2C-A26F1CF16EDB}" sibTransId="{CEA9F828-BE57-453A-A54E-A6EC33AFBCCD}"/>
-    <dgm:cxn modelId="{A3A9C847-8016-4C56-87CF-0D758AC0FD37}" type="presOf" srcId="{2B66A1F6-12D1-4DDD-9B5C-5D8ED978AECC}" destId="{525AC2B9-A9B3-421F-8295-DDDAEF106982}" srcOrd="0" destOrd="0" presId="urn:microsoft.com/office/officeart/2005/8/layout/cycle5"/>
-    <dgm:cxn modelId="{E63A397D-77E4-48F1-8416-55B4A08D5E52}" type="presOf" srcId="{9A60A16F-A66C-4ED2-9A40-6E30423E9BF5}" destId="{F7855BF3-22A8-429C-B4D1-32076FE04AE0}" srcOrd="0" destOrd="0" presId="urn:microsoft.com/office/officeart/2005/8/layout/cycle5"/>
+    <dgm:cxn modelId="{5C2501FD-A2B5-4BE5-8BA1-0ED27A11D482}" type="presOf" srcId="{CEA9F828-BE57-453A-A54E-A6EC33AFBCCD}" destId="{B65EF14B-FA96-4748-A635-8BC6E9A10AA7}" srcOrd="0" destOrd="0" presId="urn:microsoft.com/office/officeart/2005/8/layout/cycle5"/>
     <dgm:cxn modelId="{FA8EE4FA-C377-4F2B-9065-F5B70902B4BC}" type="presOf" srcId="{00CC421B-497A-4F76-A442-1E9E52125F05}" destId="{780F3454-400F-4740-B57A-513D9F9B6B4E}" srcOrd="0" destOrd="0" presId="urn:microsoft.com/office/officeart/2005/8/layout/cycle5"/>
-    <dgm:cxn modelId="{DDD5AC35-7B06-4665-826C-B106F4C9FC5D}" srcId="{3B5F74FA-ED2F-4EA2-82BC-7E9048CFDC9F}" destId="{6AC6B8CA-4567-4603-9CBB-067A92FC918B}" srcOrd="3" destOrd="0" parTransId="{699C2746-D394-40EB-A4D4-67E9BF777AE9}" sibTransId="{4C573742-A7BE-4E0C-8C5C-646F44DF24E2}"/>
     <dgm:cxn modelId="{9AD102B5-0B5A-4C7F-A795-EBFC810ED24A}" srcId="{3B5F74FA-ED2F-4EA2-82BC-7E9048CFDC9F}" destId="{80F6A064-E0C0-445B-837A-BF62EBC510F1}" srcOrd="2" destOrd="0" parTransId="{89BEC3ED-D3D4-4C7F-8F79-7C275ABDFD6B}" sibTransId="{00023D41-C998-4F73-B719-2AA493E23450}"/>
-    <dgm:cxn modelId="{27652898-4788-4532-8B35-8E71ED80781E}" type="presOf" srcId="{0C3ACD0E-FE3E-4458-84C9-2C40F787C9E0}" destId="{D81CD727-4EB5-457B-AA0A-B207EB369262}" srcOrd="0" destOrd="0" presId="urn:microsoft.com/office/officeart/2005/8/layout/cycle5"/>
-    <dgm:cxn modelId="{615CB036-1AE7-4CDB-9C9A-9ACD651743DF}" type="presOf" srcId="{00023D41-C998-4F73-B719-2AA493E23450}" destId="{34FCCFF9-3C73-4A16-9E5C-054DD6F53C32}" srcOrd="0" destOrd="0" presId="urn:microsoft.com/office/officeart/2005/8/layout/cycle5"/>
-    <dgm:cxn modelId="{C9B954CF-064D-4233-8436-EA768FAAD9C3}" type="presOf" srcId="{6AC6B8CA-4567-4603-9CBB-067A92FC918B}" destId="{6AC99B47-2CB9-468A-A1B6-25538D41966B}" srcOrd="0" destOrd="0" presId="urn:microsoft.com/office/officeart/2005/8/layout/cycle5"/>
-    <dgm:cxn modelId="{5A2A68D8-6F07-403D-8CA9-F6D2664DFB69}" srcId="{3B5F74FA-ED2F-4EA2-82BC-7E9048CFDC9F}" destId="{0C3ACD0E-FE3E-4458-84C9-2C40F787C9E0}" srcOrd="1" destOrd="0" parTransId="{61672426-A5FC-46BF-AEF9-A15B553291C5}" sibTransId="{9225B7DA-BB33-4A44-A21B-3D73446A352E}"/>
-    <dgm:cxn modelId="{E78FAEEE-33FB-4382-8E5B-AD00BE7939B7}" type="presOf" srcId="{9225B7DA-BB33-4A44-A21B-3D73446A352E}" destId="{05D4ACD9-016A-4612-B7BA-E29F5EC598F2}" srcOrd="0" destOrd="0" presId="urn:microsoft.com/office/officeart/2005/8/layout/cycle5"/>
     <dgm:cxn modelId="{D5954684-5473-46B4-8FCD-A8D73043C354}" type="presOf" srcId="{3B5F74FA-ED2F-4EA2-82BC-7E9048CFDC9F}" destId="{303A1F29-5640-4A40-958F-C8B65201F37F}" srcOrd="0" destOrd="0" presId="urn:microsoft.com/office/officeart/2005/8/layout/cycle5"/>
-    <dgm:cxn modelId="{78C2E60F-DCA1-42FA-BC34-6C82F1FB010D}" type="presOf" srcId="{4C573742-A7BE-4E0C-8C5C-646F44DF24E2}" destId="{02B029A9-3839-40BE-86FD-924212B8FE47}" srcOrd="0" destOrd="0" presId="urn:microsoft.com/office/officeart/2005/8/layout/cycle5"/>
-    <dgm:cxn modelId="{5C2501FD-A2B5-4BE5-8BA1-0ED27A11D482}" type="presOf" srcId="{CEA9F828-BE57-453A-A54E-A6EC33AFBCCD}" destId="{B65EF14B-FA96-4748-A635-8BC6E9A10AA7}" srcOrd="0" destOrd="0" presId="urn:microsoft.com/office/officeart/2005/8/layout/cycle5"/>
     <dgm:cxn modelId="{DE0BAF8D-DA01-4B4B-AFA9-2920FC6741A3}" type="presParOf" srcId="{303A1F29-5640-4A40-958F-C8B65201F37F}" destId="{525AC2B9-A9B3-421F-8295-DDDAEF106982}" srcOrd="0" destOrd="0" presId="urn:microsoft.com/office/officeart/2005/8/layout/cycle5"/>
     <dgm:cxn modelId="{B5083E2E-AF46-481E-AFB2-07096A4FF496}" type="presParOf" srcId="{303A1F29-5640-4A40-958F-C8B65201F37F}" destId="{98EF8E6B-C524-489F-AD3D-B2FA182CAA53}" srcOrd="1" destOrd="0" presId="urn:microsoft.com/office/officeart/2005/8/layout/cycle5"/>
     <dgm:cxn modelId="{9578BFC9-411D-47F5-87ED-BFEBC3B4FF2A}" type="presParOf" srcId="{303A1F29-5640-4A40-958F-C8B65201F37F}" destId="{F7855BF3-22A8-429C-B4D1-32076FE04AE0}" srcOrd="2" destOrd="0" presId="urn:microsoft.com/office/officeart/2005/8/layout/cycle5"/>
@@ -7504,8 +7581,8 @@
       </dsp:nvSpPr>
       <dsp:spPr>
         <a:xfrm>
-          <a:off x="0" y="200951"/>
-          <a:ext cx="2687960" cy="421200"/>
+          <a:off x="0" y="236956"/>
+          <a:ext cx="2831976" cy="421200"/>
         </a:xfrm>
         <a:prstGeom prst="roundRect">
           <a:avLst/>
@@ -7570,8 +7647,8 @@
         </a:p>
       </dsp:txBody>
       <dsp:txXfrm>
-        <a:off x="0" y="200951"/>
-        <a:ext cx="2687960" cy="421200"/>
+        <a:off x="0" y="236956"/>
+        <a:ext cx="2831976" cy="421200"/>
       </dsp:txXfrm>
     </dsp:sp>
     <dsp:sp modelId="{D4F89B54-BF57-4BF6-BD94-017C167A7257}">
@@ -7581,8 +7658,8 @@
       </dsp:nvSpPr>
       <dsp:spPr>
         <a:xfrm>
-          <a:off x="0" y="673992"/>
-          <a:ext cx="2687960" cy="421200"/>
+          <a:off x="0" y="709996"/>
+          <a:ext cx="2831976" cy="421200"/>
         </a:xfrm>
         <a:prstGeom prst="roundRect">
           <a:avLst/>
@@ -7645,14 +7722,14 @@
           </a:r>
           <a:r>
             <a:rPr lang="de-DE" sz="1800" kern="1200" dirty="0" err="1" smtClean="0"/>
-            <a:t>Openstreetmap</a:t>
+            <a:t>OpenStreetMap</a:t>
           </a:r>
           <a:endParaRPr lang="de-DE" sz="1800" kern="1200" dirty="0"/>
         </a:p>
       </dsp:txBody>
       <dsp:txXfrm>
-        <a:off x="0" y="673992"/>
-        <a:ext cx="2687960" cy="421200"/>
+        <a:off x="0" y="709996"/>
+        <a:ext cx="2831976" cy="421200"/>
       </dsp:txXfrm>
     </dsp:sp>
   </dsp:spTree>
@@ -17969,7 +18046,7 @@
     </p:spTree>
     <p:extLst>
       <p:ext uri="{BB962C8B-B14F-4D97-AF65-F5344CB8AC3E}">
-        <p14:creationId xmlns="" xmlns:p14="http://schemas.microsoft.com/office/powerpoint/2010/main" val="1350081241"/>
+        <p14:creationId xmlns:p14="http://schemas.microsoft.com/office/powerpoint/2010/main" xmlns="" val="1350081241"/>
       </p:ext>
     </p:extLst>
   </p:cSld>
@@ -18297,7 +18374,7 @@
     </p:spTree>
     <p:extLst>
       <p:ext uri="{BB962C8B-B14F-4D97-AF65-F5344CB8AC3E}">
-        <p14:creationId xmlns="" xmlns:p14="http://schemas.microsoft.com/office/powerpoint/2010/main" val="2076992510"/>
+        <p14:creationId xmlns:p14="http://schemas.microsoft.com/office/powerpoint/2010/main" xmlns="" val="2076992510"/>
       </p:ext>
     </p:extLst>
   </p:cSld>
@@ -18530,7 +18607,7 @@
     </p:spTree>
     <p:extLst>
       <p:ext uri="{BB962C8B-B14F-4D97-AF65-F5344CB8AC3E}">
-        <p14:creationId xmlns="" xmlns:p14="http://schemas.microsoft.com/office/powerpoint/2010/main" val="3847813400"/>
+        <p14:creationId xmlns:p14="http://schemas.microsoft.com/office/powerpoint/2010/main" xmlns="" val="3847813400"/>
       </p:ext>
     </p:extLst>
   </p:cSld>
@@ -18569,7 +18646,7 @@
           <a:blip r:embed="rId2" cstate="print">
             <a:extLst>
               <a:ext uri="{28A0092B-C50C-407E-A947-70E740481C1C}">
-                <a14:useLocalDpi xmlns="" xmlns:a14="http://schemas.microsoft.com/office/drawing/2010/main" val="0"/>
+                <a14:useLocalDpi xmlns:a14="http://schemas.microsoft.com/office/drawing/2010/main" xmlns="" val="0"/>
               </a:ext>
             </a:extLst>
           </a:blip>
@@ -18982,7 +19059,7 @@
             <a:fld id="{80E101DA-C805-49D6-936E-EF17408DE37B}" type="datetime1">
               <a:rPr lang="de-DE" smtClean="0"/>
               <a:pPr/>
-              <a:t>05.01.2015</a:t>
+              <a:t>06.01.2015</a:t>
             </a:fld>
             <a:endParaRPr lang="de-DE" dirty="0"/>
           </a:p>
@@ -19162,7 +19239,7 @@
             <a:fld id="{2B68D019-5134-4866-8BCC-6AD2983F956C}" type="datetime1">
               <a:rPr lang="de-DE" smtClean="0"/>
               <a:pPr/>
-              <a:t>05.01.2015</a:t>
+              <a:t>06.01.2015</a:t>
             </a:fld>
             <a:endParaRPr lang="de-DE" dirty="0"/>
           </a:p>
@@ -19871,7 +19948,7 @@
             <a:fld id="{503864FC-C1F6-4F60-90E2-4C82285A7CB6}" type="datetime1">
               <a:rPr lang="de-DE" smtClean="0"/>
               <a:pPr/>
-              <a:t>05.01.2015</a:t>
+              <a:t>06.01.2015</a:t>
             </a:fld>
             <a:endParaRPr lang="de-DE" dirty="0"/>
           </a:p>
@@ -20298,7 +20375,7 @@
             <a:fld id="{DFFFF499-D2C2-429B-A38D-874884AC2B44}" type="datetime1">
               <a:rPr lang="de-DE" smtClean="0"/>
               <a:pPr/>
-              <a:t>05.01.2015</a:t>
+              <a:t>06.01.2015</a:t>
             </a:fld>
             <a:endParaRPr lang="de-DE" dirty="0"/>
           </a:p>
@@ -20416,7 +20493,7 @@
             <a:fld id="{92EEC2FF-F6B1-4953-8BD6-DF423CDA3B5D}" type="datetime1">
               <a:rPr lang="de-DE" smtClean="0"/>
               <a:pPr/>
-              <a:t>05.01.2015</a:t>
+              <a:t>06.01.2015</a:t>
             </a:fld>
             <a:endParaRPr lang="de-DE" dirty="0"/>
           </a:p>
@@ -20511,7 +20588,7 @@
             <a:fld id="{CC0FF657-D1DB-4306-82A3-A2011C94EF85}" type="datetime1">
               <a:rPr lang="de-DE" smtClean="0"/>
               <a:pPr/>
-              <a:t>05.01.2015</a:t>
+              <a:t>06.01.2015</a:t>
             </a:fld>
             <a:endParaRPr lang="de-DE" dirty="0"/>
           </a:p>
@@ -20788,7 +20865,7 @@
             <a:fld id="{7B39ADCC-593E-41F1-8EDC-3499514C881E}" type="datetime1">
               <a:rPr lang="de-DE" smtClean="0"/>
               <a:pPr/>
-              <a:t>05.01.2015</a:t>
+              <a:t>06.01.2015</a:t>
             </a:fld>
             <a:endParaRPr lang="de-DE" dirty="0"/>
           </a:p>
@@ -21045,7 +21122,7 @@
             <a:fld id="{2517161F-0686-4A32-B5C2-6110D54CBF61}" type="datetime1">
               <a:rPr lang="de-DE" smtClean="0"/>
               <a:pPr/>
-              <a:t>05.01.2015</a:t>
+              <a:t>06.01.2015</a:t>
             </a:fld>
             <a:endParaRPr lang="de-DE" dirty="0"/>
           </a:p>
@@ -21456,7 +21533,7 @@
             <a:fld id="{C01FFB54-A4C6-43F5-85F0-3FD9312F6439}" type="datetime1">
               <a:rPr lang="de-DE" smtClean="0"/>
               <a:pPr/>
-              <a:t>05.01.2015</a:t>
+              <a:t>06.01.2015</a:t>
             </a:fld>
             <a:endParaRPr lang="de-DE" dirty="0"/>
           </a:p>
@@ -22223,12 +22300,12 @@
               <a:t> initialisieren: </a:t>
             </a:r>
             <a:r>
-              <a:rPr lang="de-DE" dirty="0" err="1" smtClean="0"/>
-              <a:t>Kateggorien</a:t>
-            </a:r>
-            <a:r>
               <a:rPr lang="de-DE" dirty="0" smtClean="0"/>
-              <a:t> aus </a:t>
+              <a:t>Kategorien </a:t>
+            </a:r>
+            <a:r>
+              <a:rPr lang="de-DE" dirty="0" smtClean="0"/>
+              <a:t>aus </a:t>
             </a:r>
             <a:r>
               <a:rPr lang="de-DE" dirty="0" err="1" smtClean="0"/>
@@ -22463,29 +22540,6 @@
       </p:sp>
       <p:sp>
         <p:nvSpPr>
-          <p:cNvPr id="3" name="Inhaltsplatzhalter 2"/>
-          <p:cNvSpPr>
-            <a:spLocks noGrp="1"/>
-          </p:cNvSpPr>
-          <p:nvPr>
-            <p:ph idx="1"/>
-          </p:nvPr>
-        </p:nvSpPr>
-        <p:spPr/>
-        <p:txBody>
-          <a:bodyPr/>
-          <a:lstStyle/>
-          <a:p>
-            <a:r>
-              <a:rPr lang="de-DE" dirty="0" smtClean="0"/>
-              <a:t>GUI-Oberfläche</a:t>
-            </a:r>
-            <a:endParaRPr lang="de-DE" dirty="0"/>
-          </a:p>
-        </p:txBody>
-      </p:sp>
-      <p:sp>
-        <p:nvSpPr>
           <p:cNvPr id="4" name="Fußzeilenplatzhalter 3"/>
           <p:cNvSpPr>
             <a:spLocks noGrp="1"/>
@@ -22557,6 +22611,29 @@
           </a:p>
         </p:txBody>
       </p:sp>
+      <p:pic>
+        <p:nvPicPr>
+          <p:cNvPr id="6" name="Inhaltsplatzhalter 5" descr="gui.png"/>
+          <p:cNvPicPr>
+            <a:picLocks noGrp="1" noChangeAspect="1"/>
+          </p:cNvPicPr>
+          <p:nvPr>
+            <p:ph idx="1"/>
+          </p:nvPr>
+        </p:nvPicPr>
+        <p:blipFill>
+          <a:blip r:embed="rId2" cstate="print"/>
+          <a:stretch>
+            <a:fillRect/>
+          </a:stretch>
+        </p:blipFill>
+        <p:spPr>
+          <a:xfrm>
+            <a:off x="238060" y="1196752"/>
+            <a:ext cx="8582412" cy="4910033"/>
+          </a:xfrm>
+        </p:spPr>
+      </p:pic>
     </p:spTree>
   </p:cSld>
   <p:clrMapOvr>
@@ -22565,7 +22642,75 @@
   <p:timing>
     <p:tnLst>
       <p:par>
-        <p:cTn id="1" dur="indefinite" restart="never" nodeType="tmRoot"/>
+        <p:cTn id="1" dur="indefinite" restart="never" nodeType="tmRoot">
+          <p:childTnLst>
+            <p:seq concurrent="1" nextAc="seek">
+              <p:cTn id="2" dur="indefinite" nodeType="mainSeq">
+                <p:childTnLst>
+                  <p:par>
+                    <p:cTn id="3" fill="hold">
+                      <p:stCondLst>
+                        <p:cond delay="indefinite"/>
+                      </p:stCondLst>
+                      <p:childTnLst>
+                        <p:par>
+                          <p:cTn id="4" fill="hold">
+                            <p:stCondLst>
+                              <p:cond delay="0"/>
+                            </p:stCondLst>
+                            <p:childTnLst>
+                              <p:par>
+                                <p:cTn id="5" presetID="1" presetClass="entr" presetSubtype="0" fill="hold" nodeType="clickEffect">
+                                  <p:stCondLst>
+                                    <p:cond delay="0"/>
+                                  </p:stCondLst>
+                                  <p:childTnLst>
+                                    <p:set>
+                                      <p:cBhvr>
+                                        <p:cTn id="6" dur="1" fill="hold">
+                                          <p:stCondLst>
+                                            <p:cond delay="0"/>
+                                          </p:stCondLst>
+                                        </p:cTn>
+                                        <p:tgtEl>
+                                          <p:spTgt spid="6"/>
+                                        </p:tgtEl>
+                                        <p:attrNameLst>
+                                          <p:attrName>style.visibility</p:attrName>
+                                        </p:attrNameLst>
+                                      </p:cBhvr>
+                                      <p:to>
+                                        <p:strVal val="visible"/>
+                                      </p:to>
+                                    </p:set>
+                                  </p:childTnLst>
+                                </p:cTn>
+                              </p:par>
+                            </p:childTnLst>
+                          </p:cTn>
+                        </p:par>
+                      </p:childTnLst>
+                    </p:cTn>
+                  </p:par>
+                </p:childTnLst>
+              </p:cTn>
+              <p:prevCondLst>
+                <p:cond evt="onPrev" delay="0">
+                  <p:tgtEl>
+                    <p:sldTgt/>
+                  </p:tgtEl>
+                </p:cond>
+              </p:prevCondLst>
+              <p:nextCondLst>
+                <p:cond evt="onNext" delay="0">
+                  <p:tgtEl>
+                    <p:sldTgt/>
+                  </p:tgtEl>
+                </p:cond>
+              </p:nextCondLst>
+            </p:seq>
+          </p:childTnLst>
+        </p:cTn>
       </p:par>
     </p:tnLst>
   </p:timing>
@@ -22708,6 +22853,30 @@
           </a:p>
         </p:txBody>
       </p:sp>
+      <p:pic>
+        <p:nvPicPr>
+          <p:cNvPr id="6" name="Grafik 5" descr="GUIPackage_pres.png"/>
+          <p:cNvPicPr>
+            <a:picLocks noChangeAspect="1"/>
+          </p:cNvPicPr>
+          <p:nvPr/>
+        </p:nvPicPr>
+        <p:blipFill>
+          <a:blip r:embed="rId2" cstate="print"/>
+          <a:stretch>
+            <a:fillRect/>
+          </a:stretch>
+        </p:blipFill>
+        <p:spPr>
+          <a:xfrm>
+            <a:off x="251520" y="1580750"/>
+            <a:ext cx="8676456" cy="4656562"/>
+          </a:xfrm>
+          <a:prstGeom prst="rect">
+            <a:avLst/>
+          </a:prstGeom>
+        </p:spPr>
+      </p:pic>
     </p:spTree>
   </p:cSld>
   <p:clrMapOvr>
@@ -22716,7 +22885,106 @@
   <p:timing>
     <p:tnLst>
       <p:par>
-        <p:cTn id="1" dur="indefinite" restart="never" nodeType="tmRoot"/>
+        <p:cTn id="1" dur="indefinite" restart="never" nodeType="tmRoot">
+          <p:childTnLst>
+            <p:seq concurrent="1" nextAc="seek">
+              <p:cTn id="2" dur="indefinite" nodeType="mainSeq">
+                <p:childTnLst>
+                  <p:par>
+                    <p:cTn id="3" fill="hold">
+                      <p:stCondLst>
+                        <p:cond delay="indefinite"/>
+                      </p:stCondLst>
+                      <p:childTnLst>
+                        <p:par>
+                          <p:cTn id="4" fill="hold">
+                            <p:stCondLst>
+                              <p:cond delay="0"/>
+                            </p:stCondLst>
+                            <p:childTnLst>
+                              <p:par>
+                                <p:cTn id="5" presetID="1" presetClass="entr" presetSubtype="0" fill="hold" nodeType="clickEffect">
+                                  <p:stCondLst>
+                                    <p:cond delay="0"/>
+                                  </p:stCondLst>
+                                  <p:childTnLst>
+                                    <p:set>
+                                      <p:cBhvr>
+                                        <p:cTn id="6" dur="1" fill="hold">
+                                          <p:stCondLst>
+                                            <p:cond delay="0"/>
+                                          </p:stCondLst>
+                                        </p:cTn>
+                                        <p:tgtEl>
+                                          <p:spTgt spid="3">
+                                            <p:txEl>
+                                              <p:pRg st="0" end="0"/>
+                                            </p:txEl>
+                                          </p:spTgt>
+                                        </p:tgtEl>
+                                        <p:attrNameLst>
+                                          <p:attrName>style.visibility</p:attrName>
+                                        </p:attrNameLst>
+                                      </p:cBhvr>
+                                      <p:to>
+                                        <p:strVal val="visible"/>
+                                      </p:to>
+                                    </p:set>
+                                  </p:childTnLst>
+                                </p:cTn>
+                              </p:par>
+                              <p:par>
+                                <p:cTn id="7" presetID="1" presetClass="entr" presetSubtype="0" fill="hold" nodeType="withEffect">
+                                  <p:stCondLst>
+                                    <p:cond delay="0"/>
+                                  </p:stCondLst>
+                                  <p:childTnLst>
+                                    <p:set>
+                                      <p:cBhvr>
+                                        <p:cTn id="8" dur="1" fill="hold">
+                                          <p:stCondLst>
+                                            <p:cond delay="0"/>
+                                          </p:stCondLst>
+                                        </p:cTn>
+                                        <p:tgtEl>
+                                          <p:spTgt spid="6"/>
+                                        </p:tgtEl>
+                                        <p:attrNameLst>
+                                          <p:attrName>style.visibility</p:attrName>
+                                        </p:attrNameLst>
+                                      </p:cBhvr>
+                                      <p:to>
+                                        <p:strVal val="visible"/>
+                                      </p:to>
+                                    </p:set>
+                                  </p:childTnLst>
+                                </p:cTn>
+                              </p:par>
+                            </p:childTnLst>
+                          </p:cTn>
+                        </p:par>
+                      </p:childTnLst>
+                    </p:cTn>
+                  </p:par>
+                </p:childTnLst>
+              </p:cTn>
+              <p:prevCondLst>
+                <p:cond evt="onPrev" delay="0">
+                  <p:tgtEl>
+                    <p:sldTgt/>
+                  </p:tgtEl>
+                </p:cond>
+              </p:prevCondLst>
+              <p:nextCondLst>
+                <p:cond evt="onNext" delay="0">
+                  <p:tgtEl>
+                    <p:sldTgt/>
+                  </p:tgtEl>
+                </p:cond>
+              </p:nextCondLst>
+            </p:seq>
+          </p:childTnLst>
+        </p:cTn>
       </p:par>
     </p:tnLst>
   </p:timing>
@@ -24474,33 +24742,15 @@
                                   </p:childTnLst>
                                 </p:cTn>
                               </p:par>
-                            </p:childTnLst>
-                          </p:cTn>
-                        </p:par>
-                      </p:childTnLst>
-                    </p:cTn>
-                  </p:par>
-                  <p:par>
-                    <p:cTn id="7" fill="hold">
-                      <p:stCondLst>
-                        <p:cond delay="indefinite"/>
-                      </p:stCondLst>
-                      <p:childTnLst>
-                        <p:par>
-                          <p:cTn id="8" fill="hold">
-                            <p:stCondLst>
-                              <p:cond delay="0"/>
-                            </p:stCondLst>
-                            <p:childTnLst>
                               <p:par>
-                                <p:cTn id="9" presetID="1" presetClass="entr" presetSubtype="0" fill="hold" nodeType="clickEffect">
+                                <p:cTn id="7" presetID="1" presetClass="entr" presetSubtype="0" fill="hold" nodeType="withEffect">
                                   <p:stCondLst>
                                     <p:cond delay="0"/>
                                   </p:stCondLst>
                                   <p:childTnLst>
                                     <p:set>
                                       <p:cBhvr>
-                                        <p:cTn id="10" dur="1" fill="hold">
+                                        <p:cTn id="8" dur="1" fill="hold">
                                           <p:stCondLst>
                                             <p:cond delay="0"/>
                                           </p:stCondLst>
@@ -24523,8 +24773,26 @@
                                   </p:childTnLst>
                                 </p:cTn>
                               </p:par>
+                            </p:childTnLst>
+                          </p:cTn>
+                        </p:par>
+                      </p:childTnLst>
+                    </p:cTn>
+                  </p:par>
+                  <p:par>
+                    <p:cTn id="9" fill="hold">
+                      <p:stCondLst>
+                        <p:cond delay="indefinite"/>
+                      </p:stCondLst>
+                      <p:childTnLst>
+                        <p:par>
+                          <p:cTn id="10" fill="hold">
+                            <p:stCondLst>
+                              <p:cond delay="0"/>
+                            </p:stCondLst>
+                            <p:childTnLst>
                               <p:par>
-                                <p:cTn id="11" presetID="1" presetClass="entr" presetSubtype="0" fill="hold" nodeType="withEffect">
+                                <p:cTn id="11" presetID="1" presetClass="entr" presetSubtype="0" fill="hold" nodeType="clickEffect">
                                   <p:stCondLst>
                                     <p:cond delay="0"/>
                                   </p:stCondLst>
@@ -25057,7 +25325,7 @@
           <a:blip r:embed="rId2" cstate="print">
             <a:extLst>
               <a:ext uri="{28A0092B-C50C-407E-A947-70E740481C1C}">
-                <a14:useLocalDpi xmlns="" xmlns:a14="http://schemas.microsoft.com/office/drawing/2010/main" val="0"/>
+                <a14:useLocalDpi xmlns:a14="http://schemas.microsoft.com/office/drawing/2010/main" xmlns="" val="0"/>
               </a:ext>
             </a:extLst>
           </a:blip>
@@ -25791,8 +26059,8 @@
           <p:nvPr/>
         </p:nvGraphicFramePr>
         <p:xfrm>
-          <a:off x="6228184" y="5085184"/>
-          <a:ext cx="2687960" cy="1296144"/>
+          <a:off x="6084168" y="4869160"/>
+          <a:ext cx="2831976" cy="1368152"/>
         </p:xfrm>
         <a:graphic>
           <a:graphicData uri="http://schemas.openxmlformats.org/drawingml/2006/diagram">
@@ -26126,23 +26394,24 @@
           <a:p>
             <a:pPr lvl="1"/>
             <a:r>
+              <a:rPr lang="de-DE" dirty="0" err="1" smtClean="0"/>
+              <a:t>Account</a:t>
+            </a:r>
+            <a:r>
               <a:rPr lang="de-DE" dirty="0" smtClean="0"/>
-              <a:t>Day</a:t>
-            </a:r>
+              <a:t> – </a:t>
+            </a:r>
+            <a:r>
+              <a:rPr lang="de-DE" dirty="0" err="1" smtClean="0"/>
+              <a:t>Category</a:t>
+            </a:r>
+            <a:endParaRPr lang="de-DE" dirty="0" smtClean="0"/>
           </a:p>
           <a:p>
             <a:pPr lvl="1"/>
             <a:r>
-              <a:rPr lang="de-DE" dirty="0" err="1" smtClean="0"/>
-              <a:t>Account</a:t>
-            </a:r>
-            <a:r>
               <a:rPr lang="de-DE" dirty="0" smtClean="0"/>
-              <a:t> – </a:t>
-            </a:r>
-            <a:r>
-              <a:rPr lang="de-DE" dirty="0" err="1" smtClean="0"/>
-              <a:t>Category</a:t>
+              <a:t>Day</a:t>
             </a:r>
             <a:endParaRPr lang="de-DE" dirty="0" smtClean="0"/>
           </a:p>
@@ -27088,7 +27357,15 @@
             <a:pPr lvl="1"/>
             <a:r>
               <a:rPr lang="de-DE" dirty="0" smtClean="0"/>
-              <a:t>Über Länder und Kalenderdaten Aggregierte Daten</a:t>
+              <a:t>Über Länder und Kalenderdaten </a:t>
+            </a:r>
+            <a:r>
+              <a:rPr lang="de-DE" dirty="0" smtClean="0"/>
+              <a:t>aggregierte </a:t>
+            </a:r>
+            <a:r>
+              <a:rPr lang="de-DE" dirty="0" smtClean="0"/>
+              <a:t>Daten</a:t>
             </a:r>
           </a:p>
           <a:p>
@@ -27151,15 +27428,47 @@
               <a:defRPr/>
             </a:pPr>
             <a:r>
-              <a:rPr lang="de-DE" smtClean="0"/>
-              <a:t>Praxis der Softwareentwicklung: Visualizing Trends. Was verrät uns Twitter?</a:t>
+              <a:rPr lang="de-DE" dirty="0" smtClean="0"/>
+              <a:t>Praxis der Softwareentwicklung: </a:t>
+            </a:r>
+            <a:r>
+              <a:rPr lang="de-DE" dirty="0" err="1" smtClean="0"/>
+              <a:t>Visualizing</a:t>
+            </a:r>
+            <a:r>
+              <a:rPr lang="de-DE" dirty="0" smtClean="0"/>
+              <a:t> Trends. Was verrät uns </a:t>
+            </a:r>
+            <a:r>
+              <a:rPr lang="de-DE" dirty="0" err="1" smtClean="0"/>
+              <a:t>Twitter</a:t>
+            </a:r>
+            <a:r>
+              <a:rPr lang="de-DE" dirty="0" smtClean="0"/>
+              <a:t>?</a:t>
             </a:r>
             <a:br>
-              <a:rPr lang="de-DE" smtClean="0"/>
+              <a:rPr lang="de-DE" dirty="0" smtClean="0"/>
             </a:br>
             <a:r>
-              <a:rPr lang="de-DE" smtClean="0"/>
-              <a:t>Einführung               Datenbank              Crawler               Kategorisierer               Benutzerschnittstelle               Datenfluss</a:t>
+              <a:rPr lang="de-DE" dirty="0" smtClean="0"/>
+              <a:t>Einführung               Datenbank              </a:t>
+            </a:r>
+            <a:r>
+              <a:rPr lang="de-DE" b="1" dirty="0" err="1" smtClean="0"/>
+              <a:t>Crawler</a:t>
+            </a:r>
+            <a:r>
+              <a:rPr lang="de-DE" dirty="0" smtClean="0"/>
+              <a:t>               </a:t>
+            </a:r>
+            <a:r>
+              <a:rPr lang="de-DE" dirty="0" err="1" smtClean="0"/>
+              <a:t>Kategorisierer</a:t>
+            </a:r>
+            <a:r>
+              <a:rPr lang="de-DE" dirty="0" smtClean="0"/>
+              <a:t>               Benutzerschnittstelle               Datenfluss</a:t>
             </a:r>
             <a:endParaRPr lang="de-DE" dirty="0"/>
           </a:p>

</xml_diff>